<commit_message>
Cleaning up the folder.
</commit_message>
<xml_diff>
--- a/4_presentation/presentation_coffee_compass.pptx
+++ b/4_presentation/presentation_coffee_compass.pptx
@@ -8,7 +8,7 @@
     <p:notesMasterId r:id="rId7"/>
   </p:notesMasterIdLst>
   <p:sldIdLst>
-    <p:sldId id="259" r:id="rId2"/>
+    <p:sldId id="266" r:id="rId2"/>
     <p:sldId id="263" r:id="rId3"/>
     <p:sldId id="258" r:id="rId4"/>
     <p:sldId id="264" r:id="rId5"/>
@@ -3393,7 +3393,7 @@
           <a:p>
             <a:fld id="{E50483E1-471E-4FC3-A599-0EF328BD2002}" type="datetimeFigureOut">
               <a:rPr lang="en-GB" smtClean="0"/>
-              <a:t>09/03/2023</a:t>
+              <a:t>06/04/2023</a:t>
             </a:fld>
             <a:endParaRPr lang="en-GB"/>
           </a:p>
@@ -3705,10 +3705,6 @@
           <a:bodyPr/>
           <a:lstStyle/>
           <a:p>
-            <a:r>
-              <a:rPr lang="de-DE" dirty="0"/>
-              <a:t>David</a:t>
-            </a:r>
             <a:endParaRPr lang="en-GB" dirty="0"/>
           </a:p>
         </p:txBody>
@@ -3793,10 +3789,6 @@
           <a:bodyPr/>
           <a:lstStyle/>
           <a:p>
-            <a:r>
-              <a:rPr lang="de-DE" dirty="0"/>
-              <a:t>David</a:t>
-            </a:r>
             <a:endParaRPr lang="en-GB" dirty="0"/>
           </a:p>
         </p:txBody>
@@ -3881,10 +3873,6 @@
           <a:bodyPr/>
           <a:lstStyle/>
           <a:p>
-            <a:r>
-              <a:rPr lang="de-DE" dirty="0"/>
-              <a:t>David</a:t>
-            </a:r>
             <a:endParaRPr lang="en-GB" dirty="0"/>
           </a:p>
         </p:txBody>
@@ -3969,10 +3957,6 @@
           <a:bodyPr/>
           <a:lstStyle/>
           <a:p>
-            <a:r>
-              <a:rPr lang="de-DE" dirty="0"/>
-              <a:t>Laurens</a:t>
-            </a:r>
             <a:endParaRPr lang="en-GB" dirty="0"/>
           </a:p>
         </p:txBody>
@@ -4057,144 +4041,7 @@
           <a:bodyPr/>
           <a:lstStyle/>
           <a:p>
-            <a:r>
-              <a:rPr lang="de-DE" dirty="0" err="1"/>
-              <a:t>Machine</a:t>
-            </a:r>
-            <a:r>
-              <a:rPr lang="de-DE" dirty="0"/>
-              <a:t> Learning: Laurens</a:t>
-            </a:r>
-          </a:p>
-          <a:p>
-            <a:r>
-              <a:rPr lang="de-DE" dirty="0"/>
-              <a:t>Natural Language Processing: David</a:t>
-            </a:r>
-          </a:p>
-          <a:p>
             <a:endParaRPr lang="de-DE" dirty="0"/>
-          </a:p>
-          <a:p>
-            <a:r>
-              <a:rPr lang="de-DE" dirty="0" err="1"/>
-              <a:t>Jupyter</a:t>
-            </a:r>
-            <a:r>
-              <a:rPr lang="de-DE" dirty="0"/>
-              <a:t> Notebook: Laurens</a:t>
-            </a:r>
-          </a:p>
-          <a:p>
-            <a:endParaRPr lang="de-DE" dirty="0"/>
-          </a:p>
-          <a:p>
-            <a:r>
-              <a:rPr lang="de-DE" dirty="0"/>
-              <a:t>Show </a:t>
-            </a:r>
-            <a:r>
-              <a:rPr lang="de-DE" dirty="0" err="1"/>
-              <a:t>following</a:t>
-            </a:r>
-            <a:r>
-              <a:rPr lang="de-DE" dirty="0"/>
-              <a:t>:</a:t>
-            </a:r>
-          </a:p>
-          <a:p>
-            <a:pPr marL="171450" indent="-171450">
-              <a:buFontTx/>
-              <a:buChar char="-"/>
-            </a:pPr>
-            <a:r>
-              <a:rPr lang="de-DE" dirty="0"/>
-              <a:t>Option 1</a:t>
-            </a:r>
-          </a:p>
-          <a:p>
-            <a:pPr marL="171450" indent="-171450">
-              <a:buFontTx/>
-              <a:buChar char="-"/>
-            </a:pPr>
-            <a:r>
-              <a:rPr lang="de-DE" dirty="0"/>
-              <a:t>Option 2 (</a:t>
-            </a:r>
-            <a:r>
-              <a:rPr lang="de-DE" dirty="0" err="1"/>
-              <a:t>only</a:t>
-            </a:r>
-            <a:r>
-              <a:rPr lang="de-DE" dirty="0"/>
-              <a:t> </a:t>
-            </a:r>
-            <a:r>
-              <a:rPr lang="de-DE" dirty="0" err="1"/>
-              <a:t>the</a:t>
-            </a:r>
-            <a:r>
-              <a:rPr lang="de-DE" dirty="0"/>
-              <a:t> top </a:t>
-            </a:r>
-            <a:r>
-              <a:rPr lang="de-DE" dirty="0" err="1"/>
-              <a:t>five</a:t>
-            </a:r>
-            <a:r>
-              <a:rPr lang="de-DE" dirty="0"/>
-              <a:t> </a:t>
-            </a:r>
-            <a:r>
-              <a:rPr lang="de-DE" dirty="0" err="1"/>
-              <a:t>price</a:t>
-            </a:r>
-            <a:r>
-              <a:rPr lang="de-DE" dirty="0"/>
-              <a:t>)</a:t>
-            </a:r>
-          </a:p>
-          <a:p>
-            <a:pPr marL="171450" indent="-171450">
-              <a:buFontTx/>
-              <a:buChar char="-"/>
-            </a:pPr>
-            <a:r>
-              <a:rPr lang="de-DE" dirty="0"/>
-              <a:t>Option 3 (</a:t>
-            </a:r>
-            <a:r>
-              <a:rPr lang="de-DE" dirty="0" err="1"/>
-              <a:t>ask</a:t>
-            </a:r>
-            <a:r>
-              <a:rPr lang="de-DE" dirty="0"/>
-              <a:t> </a:t>
-            </a:r>
-            <a:r>
-              <a:rPr lang="de-DE" dirty="0" err="1"/>
-              <a:t>audience</a:t>
-            </a:r>
-            <a:r>
-              <a:rPr lang="de-DE" dirty="0"/>
-              <a:t> </a:t>
-            </a:r>
-            <a:r>
-              <a:rPr lang="de-DE" dirty="0" err="1"/>
-              <a:t>for</a:t>
-            </a:r>
-            <a:r>
-              <a:rPr lang="de-DE" dirty="0"/>
-              <a:t> </a:t>
-            </a:r>
-            <a:r>
-              <a:rPr lang="de-DE" dirty="0" err="1"/>
-              <a:t>characteristic</a:t>
-            </a:r>
-            <a:r>
-              <a:rPr lang="de-DE" dirty="0"/>
-              <a:t>)</a:t>
-            </a:r>
           </a:p>
         </p:txBody>
       </p:sp>
@@ -4419,7 +4266,7 @@
           <a:p>
             <a:fld id="{88D38747-4367-4BD2-8D51-C97E202738E2}" type="datetime1">
               <a:rPr lang="en-US" smtClean="0"/>
-              <a:t>3/9/2023</a:t>
+              <a:t>4/6/2023</a:t>
             </a:fld>
             <a:endParaRPr lang="en-US" dirty="0"/>
           </a:p>
@@ -4724,7 +4571,7 @@
           <a:p>
             <a:fld id="{11F1B079-7EF0-44EE-B798-BCC497C9F3B2}" type="datetime1">
               <a:rPr lang="en-US" smtClean="0"/>
-              <a:t>3/9/2023</a:t>
+              <a:t>4/6/2023</a:t>
             </a:fld>
             <a:endParaRPr lang="en-US" dirty="0"/>
           </a:p>
@@ -4918,7 +4765,7 @@
           <a:p>
             <a:fld id="{28FF70A8-1D13-4657-95F0-A9EA54967B8D}" type="datetime1">
               <a:rPr lang="en-US" smtClean="0"/>
-              <a:t>3/9/2023</a:t>
+              <a:t>4/6/2023</a:t>
             </a:fld>
             <a:endParaRPr lang="en-US" dirty="0"/>
           </a:p>
@@ -5181,7 +5028,7 @@
           <a:p>
             <a:fld id="{21EB90AC-71BD-4C7F-8ACA-7B3F18292E63}" type="datetime1">
               <a:rPr lang="en-US" smtClean="0"/>
-              <a:t>3/9/2023</a:t>
+              <a:t>4/6/2023</a:t>
             </a:fld>
             <a:endParaRPr lang="en-US" dirty="0"/>
           </a:p>
@@ -5617,7 +5464,7 @@
           <a:p>
             <a:fld id="{4E6EFC2C-8905-46F0-B443-CE905B76BA01}" type="datetime1">
               <a:rPr lang="en-US" smtClean="0"/>
-              <a:t>3/9/2023</a:t>
+              <a:t>4/6/2023</a:t>
             </a:fld>
             <a:endParaRPr lang="en-US" dirty="0"/>
           </a:p>
@@ -6154,7 +6001,7 @@
           <a:p>
             <a:fld id="{D9079DC3-C9B5-499E-9140-0DC28B7074E2}" type="datetime1">
               <a:rPr lang="en-US" smtClean="0"/>
-              <a:t>3/9/2023</a:t>
+              <a:t>4/6/2023</a:t>
             </a:fld>
             <a:endParaRPr lang="en-US" dirty="0"/>
           </a:p>
@@ -7036,7 +6883,7 @@
           <a:p>
             <a:fld id="{30BB33EA-E472-4D22-9C03-A9C14AA21CED}" type="datetime1">
               <a:rPr lang="en-US" smtClean="0"/>
-              <a:t>3/9/2023</a:t>
+              <a:t>4/6/2023</a:t>
             </a:fld>
             <a:endParaRPr lang="en-US" dirty="0"/>
           </a:p>
@@ -7206,7 +7053,7 @@
           <a:p>
             <a:fld id="{217E833E-1B6D-415F-AD29-75AE8C43BD0D}" type="datetime1">
               <a:rPr lang="en-US" smtClean="0"/>
-              <a:t>3/9/2023</a:t>
+              <a:t>4/6/2023</a:t>
             </a:fld>
             <a:endParaRPr lang="en-US" dirty="0"/>
           </a:p>
@@ -7390,7 +7237,7 @@
           <a:p>
             <a:fld id="{8452596F-08A7-4B70-989A-F2B1CF31E66B}" type="datetime1">
               <a:rPr lang="en-US" smtClean="0"/>
-              <a:t>3/9/2023</a:t>
+              <a:t>4/6/2023</a:t>
             </a:fld>
             <a:endParaRPr lang="en-US" dirty="0"/>
           </a:p>
@@ -7560,7 +7407,7 @@
           <a:p>
             <a:fld id="{73C55A3C-5767-4844-A0A3-83778C2E5409}" type="datetime1">
               <a:rPr lang="en-US" smtClean="0"/>
-              <a:t>3/9/2023</a:t>
+              <a:t>4/6/2023</a:t>
             </a:fld>
             <a:endParaRPr lang="en-US" dirty="0"/>
           </a:p>
@@ -7804,7 +7651,7 @@
           <a:p>
             <a:fld id="{CAE507A8-A5CF-4D38-AB86-7EDDA87A85D4}" type="datetime1">
               <a:rPr lang="en-US" smtClean="0"/>
-              <a:t>3/9/2023</a:t>
+              <a:t>4/6/2023</a:t>
             </a:fld>
             <a:endParaRPr lang="en-US" dirty="0"/>
           </a:p>
@@ -8046,7 +7893,7 @@
           <a:p>
             <a:fld id="{BDFCD27C-8599-43EF-BA1D-14DDC1946E06}" type="datetime1">
               <a:rPr lang="en-US" smtClean="0"/>
-              <a:t>3/9/2023</a:t>
+              <a:t>4/6/2023</a:t>
             </a:fld>
             <a:endParaRPr lang="en-US" dirty="0"/>
           </a:p>
@@ -8529,7 +8376,7 @@
           <a:p>
             <a:fld id="{49343D99-809A-49C0-96E5-4250D0B498EE}" type="datetime1">
               <a:rPr lang="en-US" smtClean="0"/>
-              <a:t>3/9/2023</a:t>
+              <a:t>4/6/2023</a:t>
             </a:fld>
             <a:endParaRPr lang="en-US" dirty="0"/>
           </a:p>
@@ -8647,7 +8494,7 @@
           <a:p>
             <a:fld id="{A143DE9B-B678-4EFB-BB7D-A4370204A0B0}" type="datetime1">
               <a:rPr lang="en-US" smtClean="0"/>
-              <a:t>3/9/2023</a:t>
+              <a:t>4/6/2023</a:t>
             </a:fld>
             <a:endParaRPr lang="en-US" dirty="0"/>
           </a:p>
@@ -8742,7 +8589,7 @@
           <a:p>
             <a:fld id="{E68812DA-F765-4142-A6A3-A8ED7235E082}" type="datetime1">
               <a:rPr lang="en-US" smtClean="0"/>
-              <a:t>3/9/2023</a:t>
+              <a:t>4/6/2023</a:t>
             </a:fld>
             <a:endParaRPr lang="en-US" dirty="0"/>
           </a:p>
@@ -8997,7 +8844,7 @@
           <a:p>
             <a:fld id="{3E0277FD-7DE6-41D4-930D-AC99F5AFE54E}" type="datetime1">
               <a:rPr lang="en-US" smtClean="0"/>
-              <a:t>3/9/2023</a:t>
+              <a:t>4/6/2023</a:t>
             </a:fld>
             <a:endParaRPr lang="en-US" dirty="0"/>
           </a:p>
@@ -9304,7 +9151,7 @@
           <a:p>
             <a:fld id="{9EA15526-7079-4B7B-987C-1B5FAE11A0FF}" type="datetime1">
               <a:rPr lang="en-US" smtClean="0"/>
-              <a:t>3/9/2023</a:t>
+              <a:t>4/6/2023</a:t>
             </a:fld>
             <a:endParaRPr lang="en-US" dirty="0"/>
           </a:p>
@@ -9539,7 +9386,7 @@
           <a:p>
             <a:fld id="{073ED0CC-082F-4160-86E5-0D6041F12778}" type="datetime1">
               <a:rPr lang="en-US" smtClean="0"/>
-              <a:t>3/9/2023</a:t>
+              <a:t>4/6/2023</a:t>
             </a:fld>
             <a:endParaRPr lang="en-US" dirty="0"/>
           </a:p>
@@ -10206,25 +10053,6 @@
 <file path=ppt/slides/slide1.xml><?xml version="1.0" encoding="utf-8"?>
 <p:sld xmlns:a="http://schemas.openxmlformats.org/drawingml/2006/main" xmlns:r="http://schemas.openxmlformats.org/officeDocument/2006/relationships" xmlns:p="http://schemas.openxmlformats.org/presentationml/2006/main">
   <p:cSld>
-    <p:bg>
-      <p:bgPr>
-        <a:blipFill rotWithShape="1">
-          <a:blip r:embed="rId3">
-            <a:duotone>
-              <a:schemeClr val="bg1">
-                <a:shade val="80000"/>
-                <a:lumMod val="80000"/>
-              </a:schemeClr>
-              <a:schemeClr val="bg1">
-                <a:tint val="98000"/>
-              </a:schemeClr>
-            </a:duotone>
-          </a:blip>
-          <a:stretch/>
-        </a:blipFill>
-        <a:effectLst/>
-      </p:bgPr>
-    </p:bg>
     <p:spTree>
       <p:nvGrpSpPr>
         <p:cNvPr id="1" name=""/>
@@ -10254,7 +10082,7 @@
           <p:nvPr/>
         </p:nvPicPr>
         <p:blipFill rotWithShape="1">
-          <a:blip r:embed="rId4">
+          <a:blip r:embed="rId3">
             <a:alphaModFix amt="35000"/>
             <a:extLst>
               <a:ext uri="{28A0092B-C50C-407E-A947-70E740481C1C}">
@@ -10267,7 +10095,7 @@
         </p:blipFill>
         <p:spPr>
           <a:xfrm>
-            <a:off x="20" y="10"/>
+            <a:off x="-5280" y="10"/>
             <a:ext cx="12191980" cy="6857990"/>
           </a:xfrm>
           <a:prstGeom prst="rect">
@@ -10354,10 +10182,179 @@
           </a:p>
         </p:txBody>
       </p:sp>
+      <p:pic>
+        <p:nvPicPr>
+          <p:cNvPr id="7" name="Picture 10">
+            <a:extLst>
+              <a:ext uri="{FF2B5EF4-FFF2-40B4-BE49-F238E27FC236}">
+                <a16:creationId xmlns:a16="http://schemas.microsoft.com/office/drawing/2014/main" id="{FE0B4CD3-8512-2159-1F3A-B5238AF4189B}"/>
+              </a:ext>
+            </a:extLst>
+          </p:cNvPr>
+          <p:cNvPicPr>
+            <a:picLocks noChangeAspect="1"/>
+          </p:cNvPicPr>
+          <p:nvPr/>
+        </p:nvPicPr>
+        <p:blipFill>
+          <a:blip r:embed="rId4">
+            <a:extLst>
+              <a:ext uri="{28A0092B-C50C-407E-A947-70E740481C1C}">
+                <a14:useLocalDpi xmlns:a14="http://schemas.microsoft.com/office/drawing/2010/main" val="0"/>
+              </a:ext>
+            </a:extLst>
+          </a:blip>
+          <a:stretch>
+            <a:fillRect/>
+          </a:stretch>
+        </p:blipFill>
+        <p:spPr>
+          <a:xfrm>
+            <a:off x="129431" y="2"/>
+            <a:ext cx="784970" cy="784970"/>
+          </a:xfrm>
+          <a:prstGeom prst="rect">
+            <a:avLst/>
+          </a:prstGeom>
+        </p:spPr>
+      </p:pic>
+      <p:sp>
+        <p:nvSpPr>
+          <p:cNvPr id="8" name="Title 1">
+            <a:extLst>
+              <a:ext uri="{FF2B5EF4-FFF2-40B4-BE49-F238E27FC236}">
+                <a16:creationId xmlns:a16="http://schemas.microsoft.com/office/drawing/2014/main" id="{8116EE36-3728-CA56-2703-1CD9C80E8DDF}"/>
+              </a:ext>
+            </a:extLst>
+          </p:cNvPr>
+          <p:cNvSpPr txBox="1">
+            <a:spLocks/>
+          </p:cNvSpPr>
+          <p:nvPr/>
+        </p:nvSpPr>
+        <p:spPr>
+          <a:xfrm>
+            <a:off x="-441015" y="426777"/>
+            <a:ext cx="1948721" cy="435181"/>
+          </a:xfrm>
+          <a:prstGeom prst="rect">
+            <a:avLst/>
+          </a:prstGeom>
+          <a:effectLst>
+            <a:outerShdw blurRad="25400" dir="17880000">
+              <a:srgbClr val="000000">
+                <a:alpha val="46000"/>
+              </a:srgbClr>
+            </a:outerShdw>
+          </a:effectLst>
+        </p:spPr>
+        <p:txBody>
+          <a:bodyPr vert="horz" lIns="91440" tIns="45720" rIns="91440" bIns="45720" rtlCol="0" anchor="b">
+            <a:normAutofit/>
+          </a:bodyPr>
+          <a:lstStyle>
+            <a:lvl1pPr algn="ctr" defTabSz="457200" rtl="0" eaLnBrk="1" latinLnBrk="0" hangingPunct="1">
+              <a:lnSpc>
+                <a:spcPct val="90000"/>
+              </a:lnSpc>
+              <a:spcBef>
+                <a:spcPct val="0"/>
+              </a:spcBef>
+              <a:buNone/>
+              <a:defRPr sz="5400" kern="1200">
+                <a:ln>
+                  <a:solidFill>
+                    <a:schemeClr val="bg1">
+                      <a:lumMod val="75000"/>
+                      <a:lumOff val="25000"/>
+                      <a:alpha val="10000"/>
+                    </a:schemeClr>
+                  </a:solidFill>
+                </a:ln>
+                <a:solidFill>
+                  <a:schemeClr val="tx2"/>
+                </a:solidFill>
+                <a:effectLst>
+                  <a:outerShdw blurRad="9525" dist="25400" dir="14640000" algn="tl" rotWithShape="0">
+                    <a:schemeClr val="bg1">
+                      <a:alpha val="30000"/>
+                    </a:schemeClr>
+                  </a:outerShdw>
+                </a:effectLst>
+                <a:latin typeface="+mj-lt"/>
+                <a:ea typeface="+mj-ea"/>
+                <a:cs typeface="Trebuchet MS"/>
+              </a:defRPr>
+            </a:lvl1pPr>
+            <a:lvl2pPr eaLnBrk="1" hangingPunct="1">
+              <a:defRPr>
+                <a:solidFill>
+                  <a:schemeClr val="tx2"/>
+                </a:solidFill>
+              </a:defRPr>
+            </a:lvl2pPr>
+            <a:lvl3pPr eaLnBrk="1" hangingPunct="1">
+              <a:defRPr>
+                <a:solidFill>
+                  <a:schemeClr val="tx2"/>
+                </a:solidFill>
+              </a:defRPr>
+            </a:lvl3pPr>
+            <a:lvl4pPr eaLnBrk="1" hangingPunct="1">
+              <a:defRPr>
+                <a:solidFill>
+                  <a:schemeClr val="tx2"/>
+                </a:solidFill>
+              </a:defRPr>
+            </a:lvl4pPr>
+            <a:lvl5pPr eaLnBrk="1" hangingPunct="1">
+              <a:defRPr>
+                <a:solidFill>
+                  <a:schemeClr val="tx2"/>
+                </a:solidFill>
+              </a:defRPr>
+            </a:lvl5pPr>
+            <a:lvl6pPr eaLnBrk="1" hangingPunct="1">
+              <a:defRPr>
+                <a:solidFill>
+                  <a:schemeClr val="tx2"/>
+                </a:solidFill>
+              </a:defRPr>
+            </a:lvl6pPr>
+            <a:lvl7pPr eaLnBrk="1" hangingPunct="1">
+              <a:defRPr>
+                <a:solidFill>
+                  <a:schemeClr val="tx2"/>
+                </a:solidFill>
+              </a:defRPr>
+            </a:lvl7pPr>
+            <a:lvl8pPr eaLnBrk="1" hangingPunct="1">
+              <a:defRPr>
+                <a:solidFill>
+                  <a:schemeClr val="tx2"/>
+                </a:solidFill>
+              </a:defRPr>
+            </a:lvl8pPr>
+            <a:lvl9pPr eaLnBrk="1" hangingPunct="1">
+              <a:defRPr>
+                <a:solidFill>
+                  <a:schemeClr val="tx2"/>
+                </a:solidFill>
+              </a:defRPr>
+            </a:lvl9pPr>
+          </a:lstStyle>
+          <a:p>
+            <a:r>
+              <a:rPr lang="en-US" sz="900" dirty="0"/>
+              <a:t>CoffeeCompass</a:t>
+            </a:r>
+          </a:p>
+        </p:txBody>
+      </p:sp>
     </p:spTree>
     <p:extLst>
       <p:ext uri="{BB962C8B-B14F-4D97-AF65-F5344CB8AC3E}">
-        <p14:creationId xmlns:p14="http://schemas.microsoft.com/office/powerpoint/2010/main" val="633738316"/>
+        <p14:creationId xmlns:p14="http://schemas.microsoft.com/office/powerpoint/2010/main" val="3672843662"/>
       </p:ext>
     </p:extLst>
   </p:cSld>
@@ -10479,6 +10476,175 @@
           </a:p>
           <a:p>
             <a:endParaRPr lang="en-GB" dirty="0"/>
+          </a:p>
+        </p:txBody>
+      </p:sp>
+      <p:pic>
+        <p:nvPicPr>
+          <p:cNvPr id="5" name="Picture 10">
+            <a:extLst>
+              <a:ext uri="{FF2B5EF4-FFF2-40B4-BE49-F238E27FC236}">
+                <a16:creationId xmlns:a16="http://schemas.microsoft.com/office/drawing/2014/main" id="{9C6CEF2A-6590-7727-561A-A0D79637161B}"/>
+              </a:ext>
+            </a:extLst>
+          </p:cNvPr>
+          <p:cNvPicPr>
+            <a:picLocks noChangeAspect="1"/>
+          </p:cNvPicPr>
+          <p:nvPr/>
+        </p:nvPicPr>
+        <p:blipFill>
+          <a:blip r:embed="rId3">
+            <a:extLst>
+              <a:ext uri="{28A0092B-C50C-407E-A947-70E740481C1C}">
+                <a14:useLocalDpi xmlns:a14="http://schemas.microsoft.com/office/drawing/2010/main" val="0"/>
+              </a:ext>
+            </a:extLst>
+          </a:blip>
+          <a:stretch>
+            <a:fillRect/>
+          </a:stretch>
+        </p:blipFill>
+        <p:spPr>
+          <a:xfrm>
+            <a:off x="129431" y="2"/>
+            <a:ext cx="784970" cy="784970"/>
+          </a:xfrm>
+          <a:prstGeom prst="rect">
+            <a:avLst/>
+          </a:prstGeom>
+        </p:spPr>
+      </p:pic>
+      <p:sp>
+        <p:nvSpPr>
+          <p:cNvPr id="6" name="Title 1">
+            <a:extLst>
+              <a:ext uri="{FF2B5EF4-FFF2-40B4-BE49-F238E27FC236}">
+                <a16:creationId xmlns:a16="http://schemas.microsoft.com/office/drawing/2014/main" id="{B42A1A50-8BCA-8D96-74E5-7D7360A2F3C2}"/>
+              </a:ext>
+            </a:extLst>
+          </p:cNvPr>
+          <p:cNvSpPr txBox="1">
+            <a:spLocks/>
+          </p:cNvSpPr>
+          <p:nvPr/>
+        </p:nvSpPr>
+        <p:spPr>
+          <a:xfrm>
+            <a:off x="-441015" y="426777"/>
+            <a:ext cx="1948721" cy="435181"/>
+          </a:xfrm>
+          <a:prstGeom prst="rect">
+            <a:avLst/>
+          </a:prstGeom>
+          <a:effectLst>
+            <a:outerShdw blurRad="25400" dir="17880000">
+              <a:srgbClr val="000000">
+                <a:alpha val="46000"/>
+              </a:srgbClr>
+            </a:outerShdw>
+          </a:effectLst>
+        </p:spPr>
+        <p:txBody>
+          <a:bodyPr vert="horz" lIns="91440" tIns="45720" rIns="91440" bIns="45720" rtlCol="0" anchor="b">
+            <a:normAutofit/>
+          </a:bodyPr>
+          <a:lstStyle>
+            <a:lvl1pPr algn="ctr" defTabSz="457200" rtl="0" eaLnBrk="1" latinLnBrk="0" hangingPunct="1">
+              <a:lnSpc>
+                <a:spcPct val="90000"/>
+              </a:lnSpc>
+              <a:spcBef>
+                <a:spcPct val="0"/>
+              </a:spcBef>
+              <a:buNone/>
+              <a:defRPr sz="5400" kern="1200">
+                <a:ln>
+                  <a:solidFill>
+                    <a:schemeClr val="bg1">
+                      <a:lumMod val="75000"/>
+                      <a:lumOff val="25000"/>
+                      <a:alpha val="10000"/>
+                    </a:schemeClr>
+                  </a:solidFill>
+                </a:ln>
+                <a:solidFill>
+                  <a:schemeClr val="tx2"/>
+                </a:solidFill>
+                <a:effectLst>
+                  <a:outerShdw blurRad="9525" dist="25400" dir="14640000" algn="tl" rotWithShape="0">
+                    <a:schemeClr val="bg1">
+                      <a:alpha val="30000"/>
+                    </a:schemeClr>
+                  </a:outerShdw>
+                </a:effectLst>
+                <a:latin typeface="+mj-lt"/>
+                <a:ea typeface="+mj-ea"/>
+                <a:cs typeface="Trebuchet MS"/>
+              </a:defRPr>
+            </a:lvl1pPr>
+            <a:lvl2pPr eaLnBrk="1" hangingPunct="1">
+              <a:defRPr>
+                <a:solidFill>
+                  <a:schemeClr val="tx2"/>
+                </a:solidFill>
+              </a:defRPr>
+            </a:lvl2pPr>
+            <a:lvl3pPr eaLnBrk="1" hangingPunct="1">
+              <a:defRPr>
+                <a:solidFill>
+                  <a:schemeClr val="tx2"/>
+                </a:solidFill>
+              </a:defRPr>
+            </a:lvl3pPr>
+            <a:lvl4pPr eaLnBrk="1" hangingPunct="1">
+              <a:defRPr>
+                <a:solidFill>
+                  <a:schemeClr val="tx2"/>
+                </a:solidFill>
+              </a:defRPr>
+            </a:lvl4pPr>
+            <a:lvl5pPr eaLnBrk="1" hangingPunct="1">
+              <a:defRPr>
+                <a:solidFill>
+                  <a:schemeClr val="tx2"/>
+                </a:solidFill>
+              </a:defRPr>
+            </a:lvl5pPr>
+            <a:lvl6pPr eaLnBrk="1" hangingPunct="1">
+              <a:defRPr>
+                <a:solidFill>
+                  <a:schemeClr val="tx2"/>
+                </a:solidFill>
+              </a:defRPr>
+            </a:lvl6pPr>
+            <a:lvl7pPr eaLnBrk="1" hangingPunct="1">
+              <a:defRPr>
+                <a:solidFill>
+                  <a:schemeClr val="tx2"/>
+                </a:solidFill>
+              </a:defRPr>
+            </a:lvl7pPr>
+            <a:lvl8pPr eaLnBrk="1" hangingPunct="1">
+              <a:defRPr>
+                <a:solidFill>
+                  <a:schemeClr val="tx2"/>
+                </a:solidFill>
+              </a:defRPr>
+            </a:lvl8pPr>
+            <a:lvl9pPr eaLnBrk="1" hangingPunct="1">
+              <a:defRPr>
+                <a:solidFill>
+                  <a:schemeClr val="tx2"/>
+                </a:solidFill>
+              </a:defRPr>
+            </a:lvl9pPr>
+          </a:lstStyle>
+          <a:p>
+            <a:r>
+              <a:rPr lang="en-US" sz="900" dirty="0"/>
+              <a:t>CoffeeCompass</a:t>
+            </a:r>
           </a:p>
         </p:txBody>
       </p:sp>
@@ -10620,6 +10786,175 @@
           </a:graphicData>
         </a:graphic>
       </p:graphicFrame>
+      <p:pic>
+        <p:nvPicPr>
+          <p:cNvPr id="3" name="Picture 10">
+            <a:extLst>
+              <a:ext uri="{FF2B5EF4-FFF2-40B4-BE49-F238E27FC236}">
+                <a16:creationId xmlns:a16="http://schemas.microsoft.com/office/drawing/2014/main" id="{12E17066-0260-D333-C2DB-573BC6F1B9AF}"/>
+              </a:ext>
+            </a:extLst>
+          </p:cNvPr>
+          <p:cNvPicPr>
+            <a:picLocks noChangeAspect="1"/>
+          </p:cNvPicPr>
+          <p:nvPr/>
+        </p:nvPicPr>
+        <p:blipFill>
+          <a:blip r:embed="rId9">
+            <a:extLst>
+              <a:ext uri="{28A0092B-C50C-407E-A947-70E740481C1C}">
+                <a14:useLocalDpi xmlns:a14="http://schemas.microsoft.com/office/drawing/2010/main" val="0"/>
+              </a:ext>
+            </a:extLst>
+          </a:blip>
+          <a:stretch>
+            <a:fillRect/>
+          </a:stretch>
+        </p:blipFill>
+        <p:spPr>
+          <a:xfrm>
+            <a:off x="129431" y="2"/>
+            <a:ext cx="784970" cy="784970"/>
+          </a:xfrm>
+          <a:prstGeom prst="rect">
+            <a:avLst/>
+          </a:prstGeom>
+        </p:spPr>
+      </p:pic>
+      <p:sp>
+        <p:nvSpPr>
+          <p:cNvPr id="5" name="Title 1">
+            <a:extLst>
+              <a:ext uri="{FF2B5EF4-FFF2-40B4-BE49-F238E27FC236}">
+                <a16:creationId xmlns:a16="http://schemas.microsoft.com/office/drawing/2014/main" id="{EDEE00DE-116F-6B88-3EE8-F3D273D78F1C}"/>
+              </a:ext>
+            </a:extLst>
+          </p:cNvPr>
+          <p:cNvSpPr txBox="1">
+            <a:spLocks/>
+          </p:cNvSpPr>
+          <p:nvPr/>
+        </p:nvSpPr>
+        <p:spPr>
+          <a:xfrm>
+            <a:off x="-441015" y="426777"/>
+            <a:ext cx="1948721" cy="435181"/>
+          </a:xfrm>
+          <a:prstGeom prst="rect">
+            <a:avLst/>
+          </a:prstGeom>
+          <a:effectLst>
+            <a:outerShdw blurRad="25400" dir="17880000">
+              <a:srgbClr val="000000">
+                <a:alpha val="46000"/>
+              </a:srgbClr>
+            </a:outerShdw>
+          </a:effectLst>
+        </p:spPr>
+        <p:txBody>
+          <a:bodyPr vert="horz" lIns="91440" tIns="45720" rIns="91440" bIns="45720" rtlCol="0" anchor="b">
+            <a:normAutofit/>
+          </a:bodyPr>
+          <a:lstStyle>
+            <a:lvl1pPr algn="ctr" defTabSz="457200" rtl="0" eaLnBrk="1" latinLnBrk="0" hangingPunct="1">
+              <a:lnSpc>
+                <a:spcPct val="90000"/>
+              </a:lnSpc>
+              <a:spcBef>
+                <a:spcPct val="0"/>
+              </a:spcBef>
+              <a:buNone/>
+              <a:defRPr sz="5400" kern="1200">
+                <a:ln>
+                  <a:solidFill>
+                    <a:schemeClr val="bg1">
+                      <a:lumMod val="75000"/>
+                      <a:lumOff val="25000"/>
+                      <a:alpha val="10000"/>
+                    </a:schemeClr>
+                  </a:solidFill>
+                </a:ln>
+                <a:solidFill>
+                  <a:schemeClr val="tx2"/>
+                </a:solidFill>
+                <a:effectLst>
+                  <a:outerShdw blurRad="9525" dist="25400" dir="14640000" algn="tl" rotWithShape="0">
+                    <a:schemeClr val="bg1">
+                      <a:alpha val="30000"/>
+                    </a:schemeClr>
+                  </a:outerShdw>
+                </a:effectLst>
+                <a:latin typeface="+mj-lt"/>
+                <a:ea typeface="+mj-ea"/>
+                <a:cs typeface="Trebuchet MS"/>
+              </a:defRPr>
+            </a:lvl1pPr>
+            <a:lvl2pPr eaLnBrk="1" hangingPunct="1">
+              <a:defRPr>
+                <a:solidFill>
+                  <a:schemeClr val="tx2"/>
+                </a:solidFill>
+              </a:defRPr>
+            </a:lvl2pPr>
+            <a:lvl3pPr eaLnBrk="1" hangingPunct="1">
+              <a:defRPr>
+                <a:solidFill>
+                  <a:schemeClr val="tx2"/>
+                </a:solidFill>
+              </a:defRPr>
+            </a:lvl3pPr>
+            <a:lvl4pPr eaLnBrk="1" hangingPunct="1">
+              <a:defRPr>
+                <a:solidFill>
+                  <a:schemeClr val="tx2"/>
+                </a:solidFill>
+              </a:defRPr>
+            </a:lvl4pPr>
+            <a:lvl5pPr eaLnBrk="1" hangingPunct="1">
+              <a:defRPr>
+                <a:solidFill>
+                  <a:schemeClr val="tx2"/>
+                </a:solidFill>
+              </a:defRPr>
+            </a:lvl5pPr>
+            <a:lvl6pPr eaLnBrk="1" hangingPunct="1">
+              <a:defRPr>
+                <a:solidFill>
+                  <a:schemeClr val="tx2"/>
+                </a:solidFill>
+              </a:defRPr>
+            </a:lvl6pPr>
+            <a:lvl7pPr eaLnBrk="1" hangingPunct="1">
+              <a:defRPr>
+                <a:solidFill>
+                  <a:schemeClr val="tx2"/>
+                </a:solidFill>
+              </a:defRPr>
+            </a:lvl7pPr>
+            <a:lvl8pPr eaLnBrk="1" hangingPunct="1">
+              <a:defRPr>
+                <a:solidFill>
+                  <a:schemeClr val="tx2"/>
+                </a:solidFill>
+              </a:defRPr>
+            </a:lvl8pPr>
+            <a:lvl9pPr eaLnBrk="1" hangingPunct="1">
+              <a:defRPr>
+                <a:solidFill>
+                  <a:schemeClr val="tx2"/>
+                </a:solidFill>
+              </a:defRPr>
+            </a:lvl9pPr>
+          </a:lstStyle>
+          <a:p>
+            <a:r>
+              <a:rPr lang="en-US" sz="900" dirty="0"/>
+              <a:t>CoffeeCompass</a:t>
+            </a:r>
+          </a:p>
+        </p:txBody>
+      </p:sp>
     </p:spTree>
     <p:extLst>
       <p:ext uri="{BB962C8B-B14F-4D97-AF65-F5344CB8AC3E}">
@@ -10862,7 +11197,7 @@
           <a:p>
             <a:r>
               <a:rPr lang="de-DE" sz="4400" dirty="0"/>
-              <a:t>The underlying database with 4929 reviews </a:t>
+              <a:t>The 4929 reviews in the underlying database </a:t>
             </a:r>
             <a:r>
               <a:rPr lang="en-GB" sz="4400" dirty="0"/>
@@ -10912,6 +11247,175 @@
               <a:buAutoNum type="arabicPeriod"/>
             </a:pPr>
             <a:endParaRPr lang="de-DE" sz="1800" dirty="0"/>
+          </a:p>
+        </p:txBody>
+      </p:sp>
+      <p:pic>
+        <p:nvPicPr>
+          <p:cNvPr id="4" name="Picture 10">
+            <a:extLst>
+              <a:ext uri="{FF2B5EF4-FFF2-40B4-BE49-F238E27FC236}">
+                <a16:creationId xmlns:a16="http://schemas.microsoft.com/office/drawing/2014/main" id="{54FF6833-7B90-F477-14CF-4E917990E0FA}"/>
+              </a:ext>
+            </a:extLst>
+          </p:cNvPr>
+          <p:cNvPicPr>
+            <a:picLocks noChangeAspect="1"/>
+          </p:cNvPicPr>
+          <p:nvPr/>
+        </p:nvPicPr>
+        <p:blipFill>
+          <a:blip r:embed="rId3">
+            <a:extLst>
+              <a:ext uri="{28A0092B-C50C-407E-A947-70E740481C1C}">
+                <a14:useLocalDpi xmlns:a14="http://schemas.microsoft.com/office/drawing/2010/main" val="0"/>
+              </a:ext>
+            </a:extLst>
+          </a:blip>
+          <a:stretch>
+            <a:fillRect/>
+          </a:stretch>
+        </p:blipFill>
+        <p:spPr>
+          <a:xfrm>
+            <a:off x="129431" y="2"/>
+            <a:ext cx="784970" cy="784970"/>
+          </a:xfrm>
+          <a:prstGeom prst="rect">
+            <a:avLst/>
+          </a:prstGeom>
+        </p:spPr>
+      </p:pic>
+      <p:sp>
+        <p:nvSpPr>
+          <p:cNvPr id="5" name="Title 1">
+            <a:extLst>
+              <a:ext uri="{FF2B5EF4-FFF2-40B4-BE49-F238E27FC236}">
+                <a16:creationId xmlns:a16="http://schemas.microsoft.com/office/drawing/2014/main" id="{A0337461-040F-AEC8-6DEE-3FF64BD9C231}"/>
+              </a:ext>
+            </a:extLst>
+          </p:cNvPr>
+          <p:cNvSpPr txBox="1">
+            <a:spLocks/>
+          </p:cNvSpPr>
+          <p:nvPr/>
+        </p:nvSpPr>
+        <p:spPr>
+          <a:xfrm>
+            <a:off x="-441015" y="426777"/>
+            <a:ext cx="1948721" cy="435181"/>
+          </a:xfrm>
+          <a:prstGeom prst="rect">
+            <a:avLst/>
+          </a:prstGeom>
+          <a:effectLst>
+            <a:outerShdw blurRad="25400" dir="17880000">
+              <a:srgbClr val="000000">
+                <a:alpha val="46000"/>
+              </a:srgbClr>
+            </a:outerShdw>
+          </a:effectLst>
+        </p:spPr>
+        <p:txBody>
+          <a:bodyPr vert="horz" lIns="91440" tIns="45720" rIns="91440" bIns="45720" rtlCol="0" anchor="b">
+            <a:normAutofit/>
+          </a:bodyPr>
+          <a:lstStyle>
+            <a:lvl1pPr algn="ctr" defTabSz="457200" rtl="0" eaLnBrk="1" latinLnBrk="0" hangingPunct="1">
+              <a:lnSpc>
+                <a:spcPct val="90000"/>
+              </a:lnSpc>
+              <a:spcBef>
+                <a:spcPct val="0"/>
+              </a:spcBef>
+              <a:buNone/>
+              <a:defRPr sz="5400" kern="1200">
+                <a:ln>
+                  <a:solidFill>
+                    <a:schemeClr val="bg1">
+                      <a:lumMod val="75000"/>
+                      <a:lumOff val="25000"/>
+                      <a:alpha val="10000"/>
+                    </a:schemeClr>
+                  </a:solidFill>
+                </a:ln>
+                <a:solidFill>
+                  <a:schemeClr val="tx2"/>
+                </a:solidFill>
+                <a:effectLst>
+                  <a:outerShdw blurRad="9525" dist="25400" dir="14640000" algn="tl" rotWithShape="0">
+                    <a:schemeClr val="bg1">
+                      <a:alpha val="30000"/>
+                    </a:schemeClr>
+                  </a:outerShdw>
+                </a:effectLst>
+                <a:latin typeface="+mj-lt"/>
+                <a:ea typeface="+mj-ea"/>
+                <a:cs typeface="Trebuchet MS"/>
+              </a:defRPr>
+            </a:lvl1pPr>
+            <a:lvl2pPr eaLnBrk="1" hangingPunct="1">
+              <a:defRPr>
+                <a:solidFill>
+                  <a:schemeClr val="tx2"/>
+                </a:solidFill>
+              </a:defRPr>
+            </a:lvl2pPr>
+            <a:lvl3pPr eaLnBrk="1" hangingPunct="1">
+              <a:defRPr>
+                <a:solidFill>
+                  <a:schemeClr val="tx2"/>
+                </a:solidFill>
+              </a:defRPr>
+            </a:lvl3pPr>
+            <a:lvl4pPr eaLnBrk="1" hangingPunct="1">
+              <a:defRPr>
+                <a:solidFill>
+                  <a:schemeClr val="tx2"/>
+                </a:solidFill>
+              </a:defRPr>
+            </a:lvl4pPr>
+            <a:lvl5pPr eaLnBrk="1" hangingPunct="1">
+              <a:defRPr>
+                <a:solidFill>
+                  <a:schemeClr val="tx2"/>
+                </a:solidFill>
+              </a:defRPr>
+            </a:lvl5pPr>
+            <a:lvl6pPr eaLnBrk="1" hangingPunct="1">
+              <a:defRPr>
+                <a:solidFill>
+                  <a:schemeClr val="tx2"/>
+                </a:solidFill>
+              </a:defRPr>
+            </a:lvl6pPr>
+            <a:lvl7pPr eaLnBrk="1" hangingPunct="1">
+              <a:defRPr>
+                <a:solidFill>
+                  <a:schemeClr val="tx2"/>
+                </a:solidFill>
+              </a:defRPr>
+            </a:lvl7pPr>
+            <a:lvl8pPr eaLnBrk="1" hangingPunct="1">
+              <a:defRPr>
+                <a:solidFill>
+                  <a:schemeClr val="tx2"/>
+                </a:solidFill>
+              </a:defRPr>
+            </a:lvl8pPr>
+            <a:lvl9pPr eaLnBrk="1" hangingPunct="1">
+              <a:defRPr>
+                <a:solidFill>
+                  <a:schemeClr val="tx2"/>
+                </a:solidFill>
+              </a:defRPr>
+            </a:lvl9pPr>
+          </a:lstStyle>
+          <a:p>
+            <a:r>
+              <a:rPr lang="en-US" sz="900" dirty="0"/>
+              <a:t>CoffeeCompass</a:t>
+            </a:r>
           </a:p>
         </p:txBody>
       </p:sp>
@@ -11102,6 +11606,175 @@
           </a:prstGeom>
         </p:spPr>
       </p:pic>
+      <p:pic>
+        <p:nvPicPr>
+          <p:cNvPr id="4" name="Picture 10">
+            <a:extLst>
+              <a:ext uri="{FF2B5EF4-FFF2-40B4-BE49-F238E27FC236}">
+                <a16:creationId xmlns:a16="http://schemas.microsoft.com/office/drawing/2014/main" id="{9E72E45E-DF2B-9D74-705F-C3916AD3DEBA}"/>
+              </a:ext>
+            </a:extLst>
+          </p:cNvPr>
+          <p:cNvPicPr>
+            <a:picLocks noChangeAspect="1"/>
+          </p:cNvPicPr>
+          <p:nvPr/>
+        </p:nvPicPr>
+        <p:blipFill>
+          <a:blip r:embed="rId3">
+            <a:extLst>
+              <a:ext uri="{28A0092B-C50C-407E-A947-70E740481C1C}">
+                <a14:useLocalDpi xmlns:a14="http://schemas.microsoft.com/office/drawing/2010/main" val="0"/>
+              </a:ext>
+            </a:extLst>
+          </a:blip>
+          <a:stretch>
+            <a:fillRect/>
+          </a:stretch>
+        </p:blipFill>
+        <p:spPr>
+          <a:xfrm>
+            <a:off x="129431" y="2"/>
+            <a:ext cx="784970" cy="784970"/>
+          </a:xfrm>
+          <a:prstGeom prst="rect">
+            <a:avLst/>
+          </a:prstGeom>
+        </p:spPr>
+      </p:pic>
+      <p:sp>
+        <p:nvSpPr>
+          <p:cNvPr id="5" name="Title 1">
+            <a:extLst>
+              <a:ext uri="{FF2B5EF4-FFF2-40B4-BE49-F238E27FC236}">
+                <a16:creationId xmlns:a16="http://schemas.microsoft.com/office/drawing/2014/main" id="{64A700F8-3AD1-76B5-184D-61C1FAF522D3}"/>
+              </a:ext>
+            </a:extLst>
+          </p:cNvPr>
+          <p:cNvSpPr txBox="1">
+            <a:spLocks/>
+          </p:cNvSpPr>
+          <p:nvPr/>
+        </p:nvSpPr>
+        <p:spPr>
+          <a:xfrm>
+            <a:off x="-441015" y="426777"/>
+            <a:ext cx="1948721" cy="435181"/>
+          </a:xfrm>
+          <a:prstGeom prst="rect">
+            <a:avLst/>
+          </a:prstGeom>
+          <a:effectLst>
+            <a:outerShdw blurRad="25400" dir="17880000">
+              <a:srgbClr val="000000">
+                <a:alpha val="46000"/>
+              </a:srgbClr>
+            </a:outerShdw>
+          </a:effectLst>
+        </p:spPr>
+        <p:txBody>
+          <a:bodyPr vert="horz" lIns="91440" tIns="45720" rIns="91440" bIns="45720" rtlCol="0" anchor="b">
+            <a:normAutofit/>
+          </a:bodyPr>
+          <a:lstStyle>
+            <a:lvl1pPr algn="ctr" defTabSz="457200" rtl="0" eaLnBrk="1" latinLnBrk="0" hangingPunct="1">
+              <a:lnSpc>
+                <a:spcPct val="90000"/>
+              </a:lnSpc>
+              <a:spcBef>
+                <a:spcPct val="0"/>
+              </a:spcBef>
+              <a:buNone/>
+              <a:defRPr sz="5400" kern="1200">
+                <a:ln>
+                  <a:solidFill>
+                    <a:schemeClr val="bg1">
+                      <a:lumMod val="75000"/>
+                      <a:lumOff val="25000"/>
+                      <a:alpha val="10000"/>
+                    </a:schemeClr>
+                  </a:solidFill>
+                </a:ln>
+                <a:solidFill>
+                  <a:schemeClr val="tx2"/>
+                </a:solidFill>
+                <a:effectLst>
+                  <a:outerShdw blurRad="9525" dist="25400" dir="14640000" algn="tl" rotWithShape="0">
+                    <a:schemeClr val="bg1">
+                      <a:alpha val="30000"/>
+                    </a:schemeClr>
+                  </a:outerShdw>
+                </a:effectLst>
+                <a:latin typeface="+mj-lt"/>
+                <a:ea typeface="+mj-ea"/>
+                <a:cs typeface="Trebuchet MS"/>
+              </a:defRPr>
+            </a:lvl1pPr>
+            <a:lvl2pPr eaLnBrk="1" hangingPunct="1">
+              <a:defRPr>
+                <a:solidFill>
+                  <a:schemeClr val="tx2"/>
+                </a:solidFill>
+              </a:defRPr>
+            </a:lvl2pPr>
+            <a:lvl3pPr eaLnBrk="1" hangingPunct="1">
+              <a:defRPr>
+                <a:solidFill>
+                  <a:schemeClr val="tx2"/>
+                </a:solidFill>
+              </a:defRPr>
+            </a:lvl3pPr>
+            <a:lvl4pPr eaLnBrk="1" hangingPunct="1">
+              <a:defRPr>
+                <a:solidFill>
+                  <a:schemeClr val="tx2"/>
+                </a:solidFill>
+              </a:defRPr>
+            </a:lvl4pPr>
+            <a:lvl5pPr eaLnBrk="1" hangingPunct="1">
+              <a:defRPr>
+                <a:solidFill>
+                  <a:schemeClr val="tx2"/>
+                </a:solidFill>
+              </a:defRPr>
+            </a:lvl5pPr>
+            <a:lvl6pPr eaLnBrk="1" hangingPunct="1">
+              <a:defRPr>
+                <a:solidFill>
+                  <a:schemeClr val="tx2"/>
+                </a:solidFill>
+              </a:defRPr>
+            </a:lvl6pPr>
+            <a:lvl7pPr eaLnBrk="1" hangingPunct="1">
+              <a:defRPr>
+                <a:solidFill>
+                  <a:schemeClr val="tx2"/>
+                </a:solidFill>
+              </a:defRPr>
+            </a:lvl7pPr>
+            <a:lvl8pPr eaLnBrk="1" hangingPunct="1">
+              <a:defRPr>
+                <a:solidFill>
+                  <a:schemeClr val="tx2"/>
+                </a:solidFill>
+              </a:defRPr>
+            </a:lvl8pPr>
+            <a:lvl9pPr eaLnBrk="1" hangingPunct="1">
+              <a:defRPr>
+                <a:solidFill>
+                  <a:schemeClr val="tx2"/>
+                </a:solidFill>
+              </a:defRPr>
+            </a:lvl9pPr>
+          </a:lstStyle>
+          <a:p>
+            <a:r>
+              <a:rPr lang="en-US" sz="900" dirty="0"/>
+              <a:t>CoffeeCompass</a:t>
+            </a:r>
+          </a:p>
+        </p:txBody>
+      </p:sp>
     </p:spTree>
     <p:extLst>
       <p:ext uri="{BB962C8B-B14F-4D97-AF65-F5344CB8AC3E}">

</xml_diff>